<commit_message>
Minor updates before presenting at: http://www.meetup.com/Baltimore-MongoDB-Users-Group/
</commit_message>
<xml_diff>
--- a/nosql/mongodb/MongoDB-Introduction-R2AD-23July2013.pptx
+++ b/nosql/mongodb/MongoDB-Introduction-R2AD-23July2013.pptx
@@ -216,7 +216,7 @@
           <a:p>
             <a:fld id="{C4E32408-AF05-4C62-8F1B-3ACE9F899DF5}" type="datetimeFigureOut">
               <a:rPr lang="en-US" smtClean="0"/>
-              <a:t>7/22/2013</a:t>
+              <a:t>7/23/2013</a:t>
             </a:fld>
             <a:endParaRPr lang="en-US"/>
           </a:p>
@@ -1043,7 +1043,7 @@
             <a:fld id="{1D8BD707-D9CF-40AE-B4C6-C98DA3205C09}" type="datetimeFigureOut">
               <a:rPr lang="en-US" smtClean="0"/>
               <a:pPr/>
-              <a:t>7/22/2013</a:t>
+              <a:t>7/23/2013</a:t>
             </a:fld>
             <a:endParaRPr lang="en-US"/>
           </a:p>
@@ -1210,7 +1210,7 @@
             <a:fld id="{1D8BD707-D9CF-40AE-B4C6-C98DA3205C09}" type="datetimeFigureOut">
               <a:rPr lang="en-US" smtClean="0"/>
               <a:pPr/>
-              <a:t>7/22/2013</a:t>
+              <a:t>7/23/2013</a:t>
             </a:fld>
             <a:endParaRPr lang="en-US"/>
           </a:p>
@@ -1387,7 +1387,7 @@
             <a:fld id="{1D8BD707-D9CF-40AE-B4C6-C98DA3205C09}" type="datetimeFigureOut">
               <a:rPr lang="en-US" smtClean="0"/>
               <a:pPr/>
-              <a:t>7/22/2013</a:t>
+              <a:t>7/23/2013</a:t>
             </a:fld>
             <a:endParaRPr lang="en-US"/>
           </a:p>
@@ -1771,7 +1771,7 @@
             <a:fld id="{1D8BD707-D9CF-40AE-B4C6-C98DA3205C09}" type="datetimeFigureOut">
               <a:rPr lang="en-US" smtClean="0"/>
               <a:pPr/>
-              <a:t>7/22/2013</a:t>
+              <a:t>7/23/2013</a:t>
             </a:fld>
             <a:endParaRPr lang="en-US"/>
           </a:p>
@@ -2021,7 +2021,7 @@
             <a:fld id="{1D8BD707-D9CF-40AE-B4C6-C98DA3205C09}" type="datetimeFigureOut">
               <a:rPr lang="en-US" smtClean="0"/>
               <a:pPr/>
-              <a:t>7/22/2013</a:t>
+              <a:t>7/23/2013</a:t>
             </a:fld>
             <a:endParaRPr lang="en-US"/>
           </a:p>
@@ -2306,7 +2306,7 @@
             <a:fld id="{1D8BD707-D9CF-40AE-B4C6-C98DA3205C09}" type="datetimeFigureOut">
               <a:rPr lang="en-US" smtClean="0"/>
               <a:pPr/>
-              <a:t>7/22/2013</a:t>
+              <a:t>7/23/2013</a:t>
             </a:fld>
             <a:endParaRPr lang="en-US"/>
           </a:p>
@@ -2725,7 +2725,7 @@
             <a:fld id="{1D8BD707-D9CF-40AE-B4C6-C98DA3205C09}" type="datetimeFigureOut">
               <a:rPr lang="en-US" smtClean="0"/>
               <a:pPr/>
-              <a:t>7/22/2013</a:t>
+              <a:t>7/23/2013</a:t>
             </a:fld>
             <a:endParaRPr lang="en-US"/>
           </a:p>
@@ -2840,7 +2840,7 @@
             <a:fld id="{1D8BD707-D9CF-40AE-B4C6-C98DA3205C09}" type="datetimeFigureOut">
               <a:rPr lang="en-US" smtClean="0"/>
               <a:pPr/>
-              <a:t>7/22/2013</a:t>
+              <a:t>7/23/2013</a:t>
             </a:fld>
             <a:endParaRPr lang="en-US"/>
           </a:p>
@@ -2932,7 +2932,7 @@
             <a:fld id="{1D8BD707-D9CF-40AE-B4C6-C98DA3205C09}" type="datetimeFigureOut">
               <a:rPr lang="en-US" smtClean="0"/>
               <a:pPr/>
-              <a:t>7/22/2013</a:t>
+              <a:t>7/23/2013</a:t>
             </a:fld>
             <a:endParaRPr lang="en-US"/>
           </a:p>
@@ -3206,7 +3206,7 @@
             <a:fld id="{1D8BD707-D9CF-40AE-B4C6-C98DA3205C09}" type="datetimeFigureOut">
               <a:rPr lang="en-US" smtClean="0"/>
               <a:pPr/>
-              <a:t>7/22/2013</a:t>
+              <a:t>7/23/2013</a:t>
             </a:fld>
             <a:endParaRPr lang="en-US"/>
           </a:p>
@@ -3456,7 +3456,7 @@
             <a:fld id="{1D8BD707-D9CF-40AE-B4C6-C98DA3205C09}" type="datetimeFigureOut">
               <a:rPr lang="en-US" smtClean="0"/>
               <a:pPr/>
-              <a:t>7/22/2013</a:t>
+              <a:t>7/23/2013</a:t>
             </a:fld>
             <a:endParaRPr lang="en-US"/>
           </a:p>
@@ -3666,7 +3666,7 @@
             <a:fld id="{1D8BD707-D9CF-40AE-B4C6-C98DA3205C09}" type="datetimeFigureOut">
               <a:rPr lang="en-US" smtClean="0"/>
               <a:pPr/>
-              <a:t>7/22/2013</a:t>
+              <a:t>7/23/2013</a:t>
             </a:fld>
             <a:endParaRPr lang="en-US"/>
           </a:p>
@@ -4084,26 +4084,84 @@
         </p:spPr>
         <p:txBody>
           <a:bodyPr>
-            <a:normAutofit fontScale="92500" lnSpcReduction="20000"/>
+            <a:normAutofit fontScale="32500" lnSpcReduction="20000"/>
           </a:bodyPr>
           <a:lstStyle/>
           <a:p>
             <a:r>
+              <a:rPr lang="en-US" sz="4800" dirty="0" smtClean="0"/>
+              <a:t>A basic overview</a:t>
+            </a:r>
+          </a:p>
+          <a:p>
+            <a:r>
+              <a:rPr lang="en-US" sz="4800" dirty="0" smtClean="0"/>
+              <a:t>Michael Behrens, R2AD, LLC</a:t>
+            </a:r>
+          </a:p>
+          <a:p>
+            <a:r>
+              <a:rPr lang="en-US" sz="4800" dirty="0" smtClean="0"/>
+              <a:t>Jose Rodriguez</a:t>
+            </a:r>
+          </a:p>
+          <a:p>
+            <a:endParaRPr lang="en-US" dirty="0" smtClean="0"/>
+          </a:p>
+          <a:p>
+            <a:r>
               <a:rPr lang="en-US" dirty="0" smtClean="0"/>
-              <a:t>A basic overview</a:t>
-            </a:r>
-          </a:p>
-          <a:p>
-            <a:r>
-              <a:rPr lang="en-US" dirty="0" smtClean="0"/>
-              <a:t>Michael Behrens, R2AD, LLC</a:t>
-            </a:r>
-          </a:p>
-          <a:p>
-            <a:r>
-              <a:rPr lang="en-US" dirty="0" smtClean="0"/>
-              <a:t>Jose Rodriguez</a:t>
-            </a:r>
+              <a:t>Brief source</a:t>
+            </a:r>
+            <a:r>
+              <a:rPr lang="en-US" dirty="0"/>
+              <a:t>: </a:t>
+            </a:r>
+            <a:endParaRPr lang="en-US" dirty="0" smtClean="0"/>
+          </a:p>
+          <a:p>
+            <a:r>
+              <a:rPr lang="en-US">
+                <a:hlinkClick r:id="rId2"/>
+              </a:rPr>
+              <a:t>https</a:t>
+            </a:r>
+            <a:r>
+              <a:rPr lang="en-US">
+                <a:hlinkClick r:id="rId2"/>
+              </a:rPr>
+              <a:t>://</a:t>
+            </a:r>
+            <a:r>
+              <a:rPr lang="en-US" smtClean="0">
+                <a:hlinkClick r:id="rId2"/>
+              </a:rPr>
+              <a:t>github.com/r2ad/planeBigData</a:t>
+            </a:r>
+            <a:endParaRPr lang="en-US" smtClean="0"/>
+          </a:p>
+          <a:p>
+            <a:r>
+              <a:rPr lang="en-US" smtClean="0">
+                <a:hlinkClick r:id="rId3"/>
+              </a:rPr>
+              <a:t>https</a:t>
+            </a:r>
+            <a:r>
+              <a:rPr lang="en-US" dirty="0">
+                <a:hlinkClick r:id="rId3"/>
+              </a:rPr>
+              <a:t>://github.com/madaxx/mongoflight</a:t>
+            </a:r>
+            <a:r>
+              <a:rPr lang="en-US" dirty="0" smtClean="0">
+                <a:hlinkClick r:id="rId3"/>
+              </a:rPr>
+              <a:t>/</a:t>
+            </a:r>
+            <a:endParaRPr lang="en-US" dirty="0" smtClean="0"/>
+          </a:p>
+          <a:p>
             <a:endParaRPr lang="en-US" dirty="0"/>
           </a:p>
         </p:txBody>
@@ -4117,7 +4175,7 @@
           <p:nvPr/>
         </p:nvPicPr>
         <p:blipFill>
-          <a:blip r:embed="rId2" cstate="print"/>
+          <a:blip r:embed="rId4" cstate="print"/>
           <a:srcRect/>
           <a:stretch>
             <a:fillRect/>
@@ -4217,7 +4275,7 @@
           <p:nvPr/>
         </p:nvPicPr>
         <p:blipFill>
-          <a:blip r:embed="rId3">
+          <a:blip r:embed="rId5">
             <a:extLst>
               <a:ext uri="{28A0092B-C50C-407E-A947-70E740481C1C}">
                 <a14:useLocalDpi xmlns:a14="http://schemas.microsoft.com/office/drawing/2010/main" val="0"/>
@@ -4257,7 +4315,7 @@
         </p:nvGrpSpPr>
         <p:grpSpPr>
           <a:xfrm>
-            <a:off x="1675567" y="174546"/>
+            <a:off x="1673146" y="174546"/>
             <a:ext cx="5905656" cy="663654"/>
             <a:chOff x="5343102" y="1002268"/>
             <a:chExt cx="5277852" cy="449684"/>
@@ -5711,11 +5769,7 @@
             </a:pPr>
             <a:r>
               <a:rPr lang="en-US" sz="2400" dirty="0" smtClean="0"/>
-              <a:t>The log file can be </a:t>
-            </a:r>
-            <a:r>
-              <a:rPr lang="en-US" sz="2400" dirty="0" smtClean="0"/>
-              <a:t>examined from the OS or from the web page.</a:t>
+              <a:t>The log file can be examined from the OS or from the web page.</a:t>
             </a:r>
             <a:endParaRPr lang="en-US" sz="2400" dirty="0"/>
           </a:p>
@@ -7350,11 +7404,6 @@
               </a:rPr>
               <a:t> : "" }</a:t>
             </a:r>
-            <a:endParaRPr lang="en-US" dirty="0">
-              <a:solidFill>
-                <a:srgbClr val="33CC33"/>
-              </a:solidFill>
-            </a:endParaRPr>
           </a:p>
         </p:txBody>
       </p:sp>
@@ -7368,11 +7417,11 @@
   <p:clrMapOvr>
     <a:masterClrMapping/>
   </p:clrMapOvr>
-  <mc:AlternateContent xmlns:mc="http://schemas.openxmlformats.org/markup-compatibility/2006">
-    <mc:Choice xmlns:p14="http://schemas.microsoft.com/office/powerpoint/2010/main" Requires="p14">
+  <mc:AlternateContent xmlns:mc="http://schemas.openxmlformats.org/markup-compatibility/2006" xmlns:p14="http://schemas.microsoft.com/office/powerpoint/2010/main">
+    <mc:Choice Requires="p14">
       <p:transition p14:dur="0"/>
     </mc:Choice>
-    <mc:Fallback>
+    <mc:Fallback xmlns="">
       <p:transition/>
     </mc:Fallback>
   </mc:AlternateContent>
@@ -8019,7 +8068,7 @@
           <a:p>
             <a:r>
               <a:rPr lang="en-US" dirty="0" smtClean="0"/>
-              <a:t>Review…..</a:t>
+              <a:t>Review…..on-line tutorial available</a:t>
             </a:r>
             <a:endParaRPr lang="en-US" dirty="0"/>
           </a:p>
@@ -9475,7 +9524,7 @@
         </p:nvSpPr>
         <p:spPr>
           <a:xfrm>
-            <a:off x="402265" y="903168"/>
+            <a:off x="381000" y="838200"/>
             <a:ext cx="8720470" cy="5632311"/>
           </a:xfrm>
           <a:prstGeom prst="rect">
@@ -9843,7 +9892,7 @@
         </p:nvSpPr>
         <p:spPr>
           <a:xfrm>
-            <a:off x="402265" y="6484088"/>
+            <a:off x="402265" y="6488668"/>
             <a:ext cx="8305800" cy="369332"/>
           </a:xfrm>
           <a:prstGeom prst="rect">
@@ -9927,11 +9976,7 @@
           <a:p>
             <a:r>
               <a:rPr lang="en-US" dirty="0" smtClean="0"/>
-              <a:t>Lots more to </a:t>
-            </a:r>
-            <a:r>
-              <a:rPr lang="en-US" dirty="0" smtClean="0"/>
-              <a:t>learn!</a:t>
+              <a:t>Lots more to learn!</a:t>
             </a:r>
             <a:endParaRPr lang="en-US" dirty="0"/>
           </a:p>
@@ -10193,7 +10238,7 @@
         </p:spPr>
         <p:txBody>
           <a:bodyPr vert="horz" lIns="91440" tIns="45720" rIns="91440" bIns="45720" rtlCol="0">
-            <a:normAutofit fontScale="85000" lnSpcReduction="20000"/>
+            <a:normAutofit fontScale="77500" lnSpcReduction="20000"/>
           </a:bodyPr>
           <a:lstStyle>
             <a:lvl1pPr marL="342900" indent="-342900" algn="l" defTabSz="914400" rtl="0" eaLnBrk="1" latinLnBrk="0" hangingPunct="1">
@@ -10346,7 +10391,7 @@
             </a:r>
             <a:r>
               <a:rPr lang="en-US" dirty="0" smtClean="0"/>
-              <a:t>a powerful </a:t>
+              <a:t>a powerful/rapid </a:t>
             </a:r>
             <a:r>
               <a:rPr lang="en-US" dirty="0"/>
@@ -10918,8 +10963,8 @@
           <a:lstStyle/>
           <a:p>
             <a:r>
-              <a:rPr lang="en-US" dirty="0"/>
-              <a:t>This is set to use the local </a:t>
+              <a:rPr lang="en-US" dirty="0" smtClean="0"/>
+              <a:t>Currently configured to use the local </a:t>
             </a:r>
             <a:r>
               <a:rPr lang="en-US" dirty="0" err="1"/>
@@ -10930,12 +10975,22 @@
               <a:t> installation but can be set to use any. So start the </a:t>
             </a:r>
             <a:r>
-              <a:rPr lang="en-US" dirty="0" err="1"/>
+              <a:rPr lang="en-US" dirty="0" err="1" smtClean="0"/>
               <a:t>mongod</a:t>
             </a:r>
             <a:r>
+              <a:rPr lang="en-US" dirty="0" smtClean="0"/>
+              <a:t>. </a:t>
+            </a:r>
+          </a:p>
+          <a:p>
+            <a:r>
+              <a:rPr lang="en-US" dirty="0" smtClean="0"/>
+              <a:t>Then </a:t>
+            </a:r>
+            <a:r>
               <a:rPr lang="en-US" dirty="0"/>
-              <a:t> (windows: C:\mongodb-win32-x86_64-2.4.3\bin&gt;mongod.exe). Then download the project and then type the following commands in the project directory</a:t>
+              <a:t>download the project and then type the following commands in the project directory</a:t>
             </a:r>
             <a:r>
               <a:rPr lang="en-US" dirty="0" smtClean="0"/>
@@ -10952,33 +11007,46 @@
           <a:p>
             <a:pPr lvl="1"/>
             <a:r>
+              <a:rPr lang="en-US" dirty="0" smtClean="0"/>
+              <a:t>update</a:t>
+            </a:r>
+            <a:endParaRPr lang="en-US" dirty="0"/>
+          </a:p>
+          <a:p>
+            <a:pPr lvl="1"/>
+            <a:r>
+              <a:rPr lang="en-US" dirty="0" smtClean="0"/>
+              <a:t>reload</a:t>
+            </a:r>
+            <a:endParaRPr lang="en-US" dirty="0"/>
+          </a:p>
+          <a:p>
+            <a:pPr lvl="1"/>
+            <a:r>
+              <a:rPr lang="en-US" dirty="0" err="1" smtClean="0"/>
+              <a:t>container:Start</a:t>
+            </a:r>
+            <a:endParaRPr lang="en-US" dirty="0" smtClean="0"/>
+          </a:p>
+          <a:p>
+            <a:r>
               <a:rPr lang="en-US" dirty="0"/>
-              <a:t>Update</a:t>
-            </a:r>
-          </a:p>
-          <a:p>
-            <a:pPr lvl="1"/>
+              <a:t>If all goes well , open your browser to localhost:8080. </a:t>
+            </a:r>
+            <a:endParaRPr lang="en-US" dirty="0" smtClean="0"/>
+          </a:p>
+          <a:p>
+            <a:r>
+              <a:rPr lang="en-US" dirty="0" smtClean="0"/>
+              <a:t>As </a:t>
+            </a:r>
             <a:r>
               <a:rPr lang="en-US" dirty="0"/>
-              <a:t>Reload</a:t>
-            </a:r>
-          </a:p>
-          <a:p>
-            <a:pPr lvl="1"/>
-            <a:r>
-              <a:rPr lang="en-US" dirty="0" err="1" smtClean="0"/>
-              <a:t>Container:Start</a:t>
-            </a:r>
-            <a:endParaRPr lang="en-US" dirty="0" smtClean="0"/>
-          </a:p>
-          <a:p>
-            <a:r>
-              <a:rPr lang="en-US" dirty="0"/>
-              <a:t>If all goes well , open your browser to localhost:8080. As you update it will create a database and a collection called airports.  </a:t>
+              <a:t>you update it will create a database and a collection called </a:t>
             </a:r>
             <a:r>
               <a:rPr lang="en-US" dirty="0" smtClean="0"/>
-              <a:t>Changing the </a:t>
+              <a:t>airports.  Changing the </a:t>
             </a:r>
             <a:r>
               <a:rPr lang="en-US" dirty="0"/>
@@ -11010,10 +11078,10 @@
             </a:r>
             <a:r>
               <a:rPr lang="en-US" dirty="0" smtClean="0"/>
-              <a:t>working </a:t>
-            </a:r>
-            <a:r>
-              <a:rPr lang="en-US" dirty="0" err="1"/>
+              <a:t>is not fully working w/</a:t>
+            </a:r>
+            <a:r>
+              <a:rPr lang="en-US" dirty="0" err="1" smtClean="0"/>
               <a:t>crudify</a:t>
             </a:r>
             <a:r>
@@ -11818,15 +11886,7 @@
           <a:p>
             <a:r>
               <a:rPr lang="en-US" dirty="0" smtClean="0"/>
-              <a:t>Next Goal: </a:t>
-            </a:r>
-            <a:r>
-              <a:rPr lang="en-US" dirty="0" smtClean="0"/>
-              <a:t>Adding </a:t>
-            </a:r>
-            <a:r>
-              <a:rPr lang="en-US" dirty="0" smtClean="0"/>
-              <a:t>search – an example</a:t>
+              <a:t>Next Goal: Adding search – an example</a:t>
             </a:r>
             <a:endParaRPr lang="en-US" dirty="0"/>
           </a:p>
@@ -12022,7 +12082,15 @@
           <a:p>
             <a:r>
               <a:rPr lang="en-US" dirty="0" smtClean="0"/>
-              <a:t>MongoDB Training</a:t>
+              <a:t>FYI: </a:t>
+            </a:r>
+            <a:r>
+              <a:rPr lang="en-US" dirty="0" err="1" smtClean="0"/>
+              <a:t>MongoDB</a:t>
+            </a:r>
+            <a:r>
+              <a:rPr lang="en-US" dirty="0" smtClean="0"/>
+              <a:t> Training</a:t>
             </a:r>
             <a:endParaRPr lang="en-US" dirty="0"/>
           </a:p>
@@ -14895,7 +14963,14 @@
             <a:pPr lvl="1"/>
             <a:r>
               <a:rPr lang="en-US" sz="1400" dirty="0" smtClean="0"/>
-              <a:t>Supports Ad Hoc Queries</a:t>
+              <a:t>JSON documents</a:t>
+            </a:r>
+          </a:p>
+          <a:p>
+            <a:pPr lvl="1"/>
+            <a:r>
+              <a:rPr lang="en-US" sz="1400" dirty="0" smtClean="0"/>
+              <a:t>Supports Ad Hoc Queries and M/R</a:t>
             </a:r>
           </a:p>
           <a:p>
@@ -16534,7 +16609,6 @@
               <a:rPr lang="en-US" sz="1800" dirty="0" smtClean="0"/>
               <a:t>10gen.</a:t>
             </a:r>
-            <a:endParaRPr lang="en-US" sz="1800" dirty="0" smtClean="0"/>
           </a:p>
         </p:txBody>
       </p:sp>
@@ -16592,11 +16666,7 @@
           <a:p>
             <a:r>
               <a:rPr lang="en-US" dirty="0" smtClean="0"/>
-              <a:t>Setup/Install…Windows </a:t>
-            </a:r>
-            <a:r>
-              <a:rPr lang="en-US" dirty="0" smtClean="0"/>
-              <a:t>Example</a:t>
+              <a:t>Setup/Install…Windows Example</a:t>
             </a:r>
             <a:endParaRPr lang="en-US" dirty="0"/>
           </a:p>
@@ -16624,15 +16694,7 @@
           <a:p>
             <a:r>
               <a:rPr lang="en-US" dirty="0" smtClean="0"/>
-              <a:t>Install and set </a:t>
-            </a:r>
-            <a:r>
-              <a:rPr lang="en-US" dirty="0" smtClean="0"/>
-              <a:t>environment path</a:t>
-            </a:r>
-            <a:r>
-              <a:rPr lang="en-US" dirty="0" smtClean="0"/>
-              <a:t>…</a:t>
+              <a:t>Install and set environment path…</a:t>
             </a:r>
           </a:p>
           <a:p>
@@ -17483,7 +17545,7 @@
         </p:blipFill>
         <p:spPr bwMode="auto">
           <a:xfrm>
-            <a:off x="5638800" y="1295400"/>
+            <a:off x="5486400" y="1219200"/>
             <a:ext cx="762000" cy="736402"/>
           </a:xfrm>
           <a:prstGeom prst="rect">
@@ -17977,15 +18039,7 @@
                   <a:srgbClr val="00B0F0"/>
                 </a:solidFill>
               </a:rPr>
-              <a:t> </a:t>
-            </a:r>
-            <a:r>
-              <a:rPr lang="en-US" b="1" dirty="0">
-                <a:solidFill>
-                  <a:srgbClr val="00B0F0"/>
-                </a:solidFill>
-              </a:rPr>
-              <a:t>/</a:t>
+              <a:t> /</a:t>
             </a:r>
             <a:r>
               <a:rPr lang="en-US" b="1" dirty="0" smtClean="0">
@@ -18132,11 +18186,7 @@
           <a:p>
             <a:r>
               <a:rPr lang="en-US" dirty="0" smtClean="0"/>
-              <a:t>Be aware of </a:t>
-            </a:r>
-            <a:r>
-              <a:rPr lang="en-US" dirty="0" smtClean="0"/>
-              <a:t>ports…firewall</a:t>
+              <a:t>Be aware of ports…firewall</a:t>
             </a:r>
             <a:r>
               <a:rPr lang="en-US" dirty="0"/>
@@ -18185,11 +18235,7 @@
             </a:r>
             <a:r>
               <a:rPr lang="en-US" sz="2400" dirty="0" smtClean="0"/>
-              <a:t> is </a:t>
-            </a:r>
-            <a:r>
-              <a:rPr lang="en-US" sz="2400" dirty="0" smtClean="0"/>
-              <a:t>waiting </a:t>
+              <a:t> is waiting </a:t>
             </a:r>
             <a:r>
               <a:rPr lang="en-US" sz="2400" dirty="0"/>
@@ -18436,11 +18482,7 @@
             </a:pPr>
             <a:r>
               <a:rPr lang="en-US" sz="1800" dirty="0" smtClean="0"/>
-              <a:t>Note: Best to allow database access only to server(s) that needed it…..keep traffic inside as much as possible – good security practice</a:t>
-            </a:r>
-            <a:r>
-              <a:rPr lang="en-US" sz="1800" dirty="0" smtClean="0"/>
-              <a:t>.  </a:t>
+              <a:t>Note: Best to allow database access only to server(s) that needed it…..keep traffic inside as much as possible – good security practice.  </a:t>
             </a:r>
             <a:r>
               <a:rPr lang="en-US" sz="1800" dirty="0"/>

</xml_diff>

<commit_message>
Added copyright to slides.  Yes, they are free to use for non commercial purposes.
</commit_message>
<xml_diff>
--- a/nosql/mongodb/MongoDB-Introduction-R2AD-23July2013.pptx
+++ b/nosql/mongodb/MongoDB-Introduction-R2AD-23July2013.pptx
@@ -216,7 +216,7 @@
           <a:p>
             <a:fld id="{C4E32408-AF05-4C62-8F1B-3ACE9F899DF5}" type="datetimeFigureOut">
               <a:rPr lang="en-US" smtClean="0"/>
-              <a:t>7/23/2013</a:t>
+              <a:t>7/25/2013</a:t>
             </a:fld>
             <a:endParaRPr lang="en-US"/>
           </a:p>
@@ -861,6 +861,90 @@
 </p:notes>
 </file>
 
+<file path=ppt/notesSlides/notesSlide6.xml><?xml version="1.0" encoding="utf-8"?>
+<p:notes xmlns:a="http://schemas.openxmlformats.org/drawingml/2006/main" xmlns:r="http://schemas.openxmlformats.org/officeDocument/2006/relationships" xmlns:p="http://schemas.openxmlformats.org/presentationml/2006/main">
+  <p:cSld>
+    <p:spTree>
+      <p:nvGrpSpPr>
+        <p:cNvPr id="1" name=""/>
+        <p:cNvGrpSpPr/>
+        <p:nvPr/>
+      </p:nvGrpSpPr>
+      <p:grpSpPr>
+        <a:xfrm>
+          <a:off x="0" y="0"/>
+          <a:ext cx="0" cy="0"/>
+          <a:chOff x="0" y="0"/>
+          <a:chExt cx="0" cy="0"/>
+        </a:xfrm>
+      </p:grpSpPr>
+      <p:sp>
+        <p:nvSpPr>
+          <p:cNvPr id="2" name="Slide Image Placeholder 1"/>
+          <p:cNvSpPr>
+            <a:spLocks noGrp="1" noRot="1" noChangeAspect="1"/>
+          </p:cNvSpPr>
+          <p:nvPr>
+            <p:ph type="sldImg"/>
+          </p:nvPr>
+        </p:nvSpPr>
+        <p:spPr/>
+      </p:sp>
+      <p:sp>
+        <p:nvSpPr>
+          <p:cNvPr id="3" name="Notes Placeholder 2"/>
+          <p:cNvSpPr>
+            <a:spLocks noGrp="1"/>
+          </p:cNvSpPr>
+          <p:nvPr>
+            <p:ph type="body" idx="1"/>
+          </p:nvPr>
+        </p:nvSpPr>
+        <p:spPr/>
+        <p:txBody>
+          <a:bodyPr/>
+          <a:lstStyle/>
+          <a:p>
+            <a:endParaRPr lang="en-US" dirty="0"/>
+          </a:p>
+        </p:txBody>
+      </p:sp>
+      <p:sp>
+        <p:nvSpPr>
+          <p:cNvPr id="4" name="Slide Number Placeholder 3"/>
+          <p:cNvSpPr>
+            <a:spLocks noGrp="1"/>
+          </p:cNvSpPr>
+          <p:nvPr>
+            <p:ph type="sldNum" sz="quarter" idx="10"/>
+          </p:nvPr>
+        </p:nvSpPr>
+        <p:spPr/>
+        <p:txBody>
+          <a:bodyPr/>
+          <a:lstStyle/>
+          <a:p>
+            <a:fld id="{41163A87-0EF0-4627-A7A1-926F227F2358}" type="slidenum">
+              <a:rPr lang="en-US" smtClean="0"/>
+              <a:t>18</a:t>
+            </a:fld>
+            <a:endParaRPr lang="en-US"/>
+          </a:p>
+        </p:txBody>
+      </p:sp>
+    </p:spTree>
+    <p:extLst>
+      <p:ext uri="{BB962C8B-B14F-4D97-AF65-F5344CB8AC3E}">
+        <p14:creationId xmlns:p14="http://schemas.microsoft.com/office/powerpoint/2010/main" val="530537225"/>
+      </p:ext>
+    </p:extLst>
+  </p:cSld>
+  <p:clrMapOvr>
+    <a:masterClrMapping/>
+  </p:clrMapOvr>
+</p:notes>
+</file>
+
 <file path=ppt/slideLayouts/slideLayout1.xml><?xml version="1.0" encoding="utf-8"?>
 <p:sldLayout xmlns:a="http://schemas.openxmlformats.org/drawingml/2006/main" xmlns:r="http://schemas.openxmlformats.org/officeDocument/2006/relationships" xmlns:p="http://schemas.openxmlformats.org/presentationml/2006/main" type="title" preserve="1">
   <p:cSld name="Title Slide">
@@ -1043,7 +1127,7 @@
             <a:fld id="{1D8BD707-D9CF-40AE-B4C6-C98DA3205C09}" type="datetimeFigureOut">
               <a:rPr lang="en-US" smtClean="0"/>
               <a:pPr/>
-              <a:t>7/23/2013</a:t>
+              <a:t>7/25/2013</a:t>
             </a:fld>
             <a:endParaRPr lang="en-US"/>
           </a:p>
@@ -1059,12 +1143,24 @@
             <p:ph type="ftr" sz="quarter" idx="11"/>
           </p:nvPr>
         </p:nvSpPr>
-        <p:spPr/>
+        <p:spPr>
+          <a:xfrm>
+            <a:off x="3124200" y="6629400"/>
+            <a:ext cx="2895600" cy="228600"/>
+          </a:xfrm>
+          <a:prstGeom prst="rect">
+            <a:avLst/>
+          </a:prstGeom>
+        </p:spPr>
         <p:txBody>
           <a:bodyPr/>
           <a:lstStyle/>
           <a:p>
-            <a:endParaRPr lang="en-US"/>
+            <a:r>
+              <a:rPr lang="en-US" dirty="0" smtClean="0"/>
+              <a:t>Copyright© 2013, R2AD, LLC</a:t>
+            </a:r>
+            <a:endParaRPr lang="en-US" dirty="0"/>
           </a:p>
         </p:txBody>
       </p:sp>
@@ -1210,7 +1306,7 @@
             <a:fld id="{1D8BD707-D9CF-40AE-B4C6-C98DA3205C09}" type="datetimeFigureOut">
               <a:rPr lang="en-US" smtClean="0"/>
               <a:pPr/>
-              <a:t>7/23/2013</a:t>
+              <a:t>7/25/2013</a:t>
             </a:fld>
             <a:endParaRPr lang="en-US"/>
           </a:p>
@@ -1226,7 +1322,15 @@
             <p:ph type="ftr" sz="quarter" idx="11"/>
           </p:nvPr>
         </p:nvSpPr>
-        <p:spPr/>
+        <p:spPr>
+          <a:xfrm>
+            <a:off x="3124200" y="6689725"/>
+            <a:ext cx="2895600" cy="168275"/>
+          </a:xfrm>
+          <a:prstGeom prst="rect">
+            <a:avLst/>
+          </a:prstGeom>
+        </p:spPr>
         <p:txBody>
           <a:bodyPr/>
           <a:lstStyle/>
@@ -1387,7 +1491,7 @@
             <a:fld id="{1D8BD707-D9CF-40AE-B4C6-C98DA3205C09}" type="datetimeFigureOut">
               <a:rPr lang="en-US" smtClean="0"/>
               <a:pPr/>
-              <a:t>7/23/2013</a:t>
+              <a:t>7/25/2013</a:t>
             </a:fld>
             <a:endParaRPr lang="en-US"/>
           </a:p>
@@ -1403,7 +1507,15 @@
             <p:ph type="ftr" sz="quarter" idx="11"/>
           </p:nvPr>
         </p:nvSpPr>
-        <p:spPr/>
+        <p:spPr>
+          <a:xfrm>
+            <a:off x="3124200" y="6689725"/>
+            <a:ext cx="2895600" cy="168275"/>
+          </a:xfrm>
+          <a:prstGeom prst="rect">
+            <a:avLst/>
+          </a:prstGeom>
+        </p:spPr>
         <p:txBody>
           <a:bodyPr/>
           <a:lstStyle/>
@@ -1771,7 +1883,7 @@
             <a:fld id="{1D8BD707-D9CF-40AE-B4C6-C98DA3205C09}" type="datetimeFigureOut">
               <a:rPr lang="en-US" smtClean="0"/>
               <a:pPr/>
-              <a:t>7/23/2013</a:t>
+              <a:t>7/25/2013</a:t>
             </a:fld>
             <a:endParaRPr lang="en-US"/>
           </a:p>
@@ -1787,12 +1899,23 @@
             <p:ph type="ftr" sz="quarter" idx="11"/>
           </p:nvPr>
         </p:nvSpPr>
-        <p:spPr/>
+        <p:spPr>
+          <a:xfrm>
+            <a:off x="3124200" y="6629400"/>
+            <a:ext cx="2895600" cy="228600"/>
+          </a:xfrm>
+          <a:prstGeom prst="rect">
+            <a:avLst/>
+          </a:prstGeom>
+        </p:spPr>
         <p:txBody>
           <a:bodyPr/>
           <a:lstStyle/>
           <a:p>
-            <a:endParaRPr lang="en-US"/>
+            <a:r>
+              <a:rPr lang="en-US" dirty="0" smtClean="0"/>
+              <a:t>Copyright© 2013, R2AD, LLC</a:t>
+            </a:r>
           </a:p>
         </p:txBody>
       </p:sp>
@@ -1877,10 +2000,10 @@
           </a:lstStyle>
           <a:p>
             <a:r>
-              <a:rPr lang="en-US" smtClean="0"/>
+              <a:rPr lang="en-US" dirty="0" smtClean="0"/>
               <a:t>Click to edit Master title style</a:t>
             </a:r>
-            <a:endParaRPr lang="en-US"/>
+            <a:endParaRPr lang="en-US" dirty="0"/>
           </a:p>
         </p:txBody>
       </p:sp>
@@ -2021,7 +2144,7 @@
             <a:fld id="{1D8BD707-D9CF-40AE-B4C6-C98DA3205C09}" type="datetimeFigureOut">
               <a:rPr lang="en-US" smtClean="0"/>
               <a:pPr/>
-              <a:t>7/23/2013</a:t>
+              <a:t>7/25/2013</a:t>
             </a:fld>
             <a:endParaRPr lang="en-US"/>
           </a:p>
@@ -2037,12 +2160,23 @@
             <p:ph type="ftr" sz="quarter" idx="11"/>
           </p:nvPr>
         </p:nvSpPr>
-        <p:spPr/>
+        <p:spPr>
+          <a:xfrm>
+            <a:off x="3124200" y="6689725"/>
+            <a:ext cx="2895600" cy="168275"/>
+          </a:xfrm>
+          <a:prstGeom prst="rect">
+            <a:avLst/>
+          </a:prstGeom>
+        </p:spPr>
         <p:txBody>
           <a:bodyPr/>
           <a:lstStyle/>
           <a:p>
-            <a:endParaRPr lang="en-US"/>
+            <a:r>
+              <a:rPr lang="en-US" dirty="0" smtClean="0"/>
+              <a:t>Copyright© 2013, R2AD, LLC</a:t>
+            </a:r>
           </a:p>
         </p:txBody>
       </p:sp>
@@ -2306,7 +2440,7 @@
             <a:fld id="{1D8BD707-D9CF-40AE-B4C6-C98DA3205C09}" type="datetimeFigureOut">
               <a:rPr lang="en-US" smtClean="0"/>
               <a:pPr/>
-              <a:t>7/23/2013</a:t>
+              <a:t>7/25/2013</a:t>
             </a:fld>
             <a:endParaRPr lang="en-US"/>
           </a:p>
@@ -2322,12 +2456,23 @@
             <p:ph type="ftr" sz="quarter" idx="11"/>
           </p:nvPr>
         </p:nvSpPr>
-        <p:spPr/>
+        <p:spPr>
+          <a:xfrm>
+            <a:off x="3124200" y="6689725"/>
+            <a:ext cx="2895600" cy="168275"/>
+          </a:xfrm>
+          <a:prstGeom prst="rect">
+            <a:avLst/>
+          </a:prstGeom>
+        </p:spPr>
         <p:txBody>
           <a:bodyPr/>
           <a:lstStyle/>
           <a:p>
-            <a:endParaRPr lang="en-US"/>
+            <a:r>
+              <a:rPr lang="en-US" dirty="0" smtClean="0"/>
+              <a:t>Copyright© 2013, R2AD, LLC</a:t>
+            </a:r>
           </a:p>
         </p:txBody>
       </p:sp>
@@ -2725,7 +2870,7 @@
             <a:fld id="{1D8BD707-D9CF-40AE-B4C6-C98DA3205C09}" type="datetimeFigureOut">
               <a:rPr lang="en-US" smtClean="0"/>
               <a:pPr/>
-              <a:t>7/23/2013</a:t>
+              <a:t>7/25/2013</a:t>
             </a:fld>
             <a:endParaRPr lang="en-US"/>
           </a:p>
@@ -2741,12 +2886,23 @@
             <p:ph type="ftr" sz="quarter" idx="11"/>
           </p:nvPr>
         </p:nvSpPr>
-        <p:spPr/>
+        <p:spPr>
+          <a:xfrm>
+            <a:off x="3124200" y="6689725"/>
+            <a:ext cx="2895600" cy="168275"/>
+          </a:xfrm>
+          <a:prstGeom prst="rect">
+            <a:avLst/>
+          </a:prstGeom>
+        </p:spPr>
         <p:txBody>
           <a:bodyPr/>
           <a:lstStyle/>
           <a:p>
-            <a:endParaRPr lang="en-US"/>
+            <a:r>
+              <a:rPr lang="en-US" dirty="0" smtClean="0"/>
+              <a:t>Copyright© 2013, R2AD, LLC</a:t>
+            </a:r>
           </a:p>
         </p:txBody>
       </p:sp>
@@ -2840,7 +2996,7 @@
             <a:fld id="{1D8BD707-D9CF-40AE-B4C6-C98DA3205C09}" type="datetimeFigureOut">
               <a:rPr lang="en-US" smtClean="0"/>
               <a:pPr/>
-              <a:t>7/23/2013</a:t>
+              <a:t>7/25/2013</a:t>
             </a:fld>
             <a:endParaRPr lang="en-US"/>
           </a:p>
@@ -2856,12 +3012,23 @@
             <p:ph type="ftr" sz="quarter" idx="11"/>
           </p:nvPr>
         </p:nvSpPr>
-        <p:spPr/>
+        <p:spPr>
+          <a:xfrm>
+            <a:off x="3124200" y="6689725"/>
+            <a:ext cx="2895600" cy="168275"/>
+          </a:xfrm>
+          <a:prstGeom prst="rect">
+            <a:avLst/>
+          </a:prstGeom>
+        </p:spPr>
         <p:txBody>
           <a:bodyPr/>
           <a:lstStyle/>
           <a:p>
-            <a:endParaRPr lang="en-US"/>
+            <a:r>
+              <a:rPr lang="en-US" dirty="0" smtClean="0"/>
+              <a:t>Copyright© 2013, R2AD, LLC</a:t>
+            </a:r>
           </a:p>
         </p:txBody>
       </p:sp>
@@ -2932,7 +3099,7 @@
             <a:fld id="{1D8BD707-D9CF-40AE-B4C6-C98DA3205C09}" type="datetimeFigureOut">
               <a:rPr lang="en-US" smtClean="0"/>
               <a:pPr/>
-              <a:t>7/23/2013</a:t>
+              <a:t>7/25/2013</a:t>
             </a:fld>
             <a:endParaRPr lang="en-US"/>
           </a:p>
@@ -2948,12 +3115,23 @@
             <p:ph type="ftr" sz="quarter" idx="11"/>
           </p:nvPr>
         </p:nvSpPr>
-        <p:spPr/>
+        <p:spPr>
+          <a:xfrm>
+            <a:off x="3124200" y="6689725"/>
+            <a:ext cx="2895600" cy="168275"/>
+          </a:xfrm>
+          <a:prstGeom prst="rect">
+            <a:avLst/>
+          </a:prstGeom>
+        </p:spPr>
         <p:txBody>
           <a:bodyPr/>
           <a:lstStyle/>
           <a:p>
-            <a:endParaRPr lang="en-US"/>
+            <a:r>
+              <a:rPr lang="en-US" dirty="0" smtClean="0"/>
+              <a:t>Copyright© 2013, R2AD, LLC</a:t>
+            </a:r>
           </a:p>
         </p:txBody>
       </p:sp>
@@ -3206,7 +3384,7 @@
             <a:fld id="{1D8BD707-D9CF-40AE-B4C6-C98DA3205C09}" type="datetimeFigureOut">
               <a:rPr lang="en-US" smtClean="0"/>
               <a:pPr/>
-              <a:t>7/23/2013</a:t>
+              <a:t>7/25/2013</a:t>
             </a:fld>
             <a:endParaRPr lang="en-US"/>
           </a:p>
@@ -3222,7 +3400,15 @@
             <p:ph type="ftr" sz="quarter" idx="11"/>
           </p:nvPr>
         </p:nvSpPr>
-        <p:spPr/>
+        <p:spPr>
+          <a:xfrm>
+            <a:off x="3124200" y="6689725"/>
+            <a:ext cx="2895600" cy="168275"/>
+          </a:xfrm>
+          <a:prstGeom prst="rect">
+            <a:avLst/>
+          </a:prstGeom>
+        </p:spPr>
         <p:txBody>
           <a:bodyPr/>
           <a:lstStyle/>
@@ -3456,7 +3642,7 @@
             <a:fld id="{1D8BD707-D9CF-40AE-B4C6-C98DA3205C09}" type="datetimeFigureOut">
               <a:rPr lang="en-US" smtClean="0"/>
               <a:pPr/>
-              <a:t>7/23/2013</a:t>
+              <a:t>7/25/2013</a:t>
             </a:fld>
             <a:endParaRPr lang="en-US"/>
           </a:p>
@@ -3472,7 +3658,15 @@
             <p:ph type="ftr" sz="quarter" idx="11"/>
           </p:nvPr>
         </p:nvSpPr>
-        <p:spPr/>
+        <p:spPr>
+          <a:xfrm>
+            <a:off x="3124200" y="6689725"/>
+            <a:ext cx="2895600" cy="168275"/>
+          </a:xfrm>
+          <a:prstGeom prst="rect">
+            <a:avLst/>
+          </a:prstGeom>
+        </p:spPr>
         <p:txBody>
           <a:bodyPr/>
           <a:lstStyle/>
@@ -3666,45 +3860,8 @@
             <a:fld id="{1D8BD707-D9CF-40AE-B4C6-C98DA3205C09}" type="datetimeFigureOut">
               <a:rPr lang="en-US" smtClean="0"/>
               <a:pPr/>
-              <a:t>7/23/2013</a:t>
+              <a:t>7/25/2013</a:t>
             </a:fld>
-            <a:endParaRPr lang="en-US"/>
-          </a:p>
-        </p:txBody>
-      </p:sp>
-      <p:sp>
-        <p:nvSpPr>
-          <p:cNvPr id="5" name="Footer Placeholder 4"/>
-          <p:cNvSpPr>
-            <a:spLocks noGrp="1"/>
-          </p:cNvSpPr>
-          <p:nvPr>
-            <p:ph type="ftr" sz="quarter" idx="3"/>
-          </p:nvPr>
-        </p:nvSpPr>
-        <p:spPr>
-          <a:xfrm>
-            <a:off x="3124200" y="6356350"/>
-            <a:ext cx="2895600" cy="365125"/>
-          </a:xfrm>
-          <a:prstGeom prst="rect">
-            <a:avLst/>
-          </a:prstGeom>
-        </p:spPr>
-        <p:txBody>
-          <a:bodyPr vert="horz" lIns="91440" tIns="45720" rIns="91440" bIns="45720" rtlCol="0" anchor="ctr"/>
-          <a:lstStyle>
-            <a:lvl1pPr algn="ctr">
-              <a:defRPr sz="1200">
-                <a:solidFill>
-                  <a:schemeClr val="tx1">
-                    <a:tint val="75000"/>
-                  </a:schemeClr>
-                </a:solidFill>
-              </a:defRPr>
-            </a:lvl1pPr>
-          </a:lstStyle>
-          <a:p>
             <a:endParaRPr lang="en-US"/>
           </a:p>
         </p:txBody>
@@ -3748,6 +3905,145 @@
               <a:t>‹#›</a:t>
             </a:fld>
             <a:endParaRPr lang="en-US"/>
+          </a:p>
+        </p:txBody>
+      </p:sp>
+      <p:sp>
+        <p:nvSpPr>
+          <p:cNvPr id="7" name="Footer Placeholder 4"/>
+          <p:cNvSpPr txBox="1">
+            <a:spLocks/>
+          </p:cNvSpPr>
+          <p:nvPr userDrawn="1"/>
+        </p:nvSpPr>
+        <p:spPr>
+          <a:xfrm>
+            <a:off x="3211033" y="6629400"/>
+            <a:ext cx="2895600" cy="228600"/>
+          </a:xfrm>
+          <a:prstGeom prst="rect">
+            <a:avLst/>
+          </a:prstGeom>
+          <a:noFill/>
+        </p:spPr>
+        <p:txBody>
+          <a:bodyPr/>
+          <a:lstStyle>
+            <a:defPPr>
+              <a:defRPr lang="en-US"/>
+            </a:defPPr>
+            <a:lvl1pPr marL="0" algn="l" defTabSz="914400" rtl="0" eaLnBrk="1" latinLnBrk="0" hangingPunct="1">
+              <a:defRPr sz="1800" kern="1200">
+                <a:solidFill>
+                  <a:schemeClr val="tx1"/>
+                </a:solidFill>
+                <a:latin typeface="+mn-lt"/>
+                <a:ea typeface="+mn-ea"/>
+                <a:cs typeface="+mn-cs"/>
+              </a:defRPr>
+            </a:lvl1pPr>
+            <a:lvl2pPr marL="457200" algn="l" defTabSz="914400" rtl="0" eaLnBrk="1" latinLnBrk="0" hangingPunct="1">
+              <a:defRPr sz="1800" kern="1200">
+                <a:solidFill>
+                  <a:schemeClr val="tx1"/>
+                </a:solidFill>
+                <a:latin typeface="+mn-lt"/>
+                <a:ea typeface="+mn-ea"/>
+                <a:cs typeface="+mn-cs"/>
+              </a:defRPr>
+            </a:lvl2pPr>
+            <a:lvl3pPr marL="914400" algn="l" defTabSz="914400" rtl="0" eaLnBrk="1" latinLnBrk="0" hangingPunct="1">
+              <a:defRPr sz="1800" kern="1200">
+                <a:solidFill>
+                  <a:schemeClr val="tx1"/>
+                </a:solidFill>
+                <a:latin typeface="+mn-lt"/>
+                <a:ea typeface="+mn-ea"/>
+                <a:cs typeface="+mn-cs"/>
+              </a:defRPr>
+            </a:lvl3pPr>
+            <a:lvl4pPr marL="1371600" algn="l" defTabSz="914400" rtl="0" eaLnBrk="1" latinLnBrk="0" hangingPunct="1">
+              <a:defRPr sz="1800" kern="1200">
+                <a:solidFill>
+                  <a:schemeClr val="tx1"/>
+                </a:solidFill>
+                <a:latin typeface="+mn-lt"/>
+                <a:ea typeface="+mn-ea"/>
+                <a:cs typeface="+mn-cs"/>
+              </a:defRPr>
+            </a:lvl4pPr>
+            <a:lvl5pPr marL="1828800" algn="l" defTabSz="914400" rtl="0" eaLnBrk="1" latinLnBrk="0" hangingPunct="1">
+              <a:defRPr sz="1800" kern="1200">
+                <a:solidFill>
+                  <a:schemeClr val="tx1"/>
+                </a:solidFill>
+                <a:latin typeface="+mn-lt"/>
+                <a:ea typeface="+mn-ea"/>
+                <a:cs typeface="+mn-cs"/>
+              </a:defRPr>
+            </a:lvl5pPr>
+            <a:lvl6pPr marL="2286000" algn="l" defTabSz="914400" rtl="0" eaLnBrk="1" latinLnBrk="0" hangingPunct="1">
+              <a:defRPr sz="1800" kern="1200">
+                <a:solidFill>
+                  <a:schemeClr val="tx1"/>
+                </a:solidFill>
+                <a:latin typeface="+mn-lt"/>
+                <a:ea typeface="+mn-ea"/>
+                <a:cs typeface="+mn-cs"/>
+              </a:defRPr>
+            </a:lvl6pPr>
+            <a:lvl7pPr marL="2743200" algn="l" defTabSz="914400" rtl="0" eaLnBrk="1" latinLnBrk="0" hangingPunct="1">
+              <a:defRPr sz="1800" kern="1200">
+                <a:solidFill>
+                  <a:schemeClr val="tx1"/>
+                </a:solidFill>
+                <a:latin typeface="+mn-lt"/>
+                <a:ea typeface="+mn-ea"/>
+                <a:cs typeface="+mn-cs"/>
+              </a:defRPr>
+            </a:lvl7pPr>
+            <a:lvl8pPr marL="3200400" algn="l" defTabSz="914400" rtl="0" eaLnBrk="1" latinLnBrk="0" hangingPunct="1">
+              <a:defRPr sz="1800" kern="1200">
+                <a:solidFill>
+                  <a:schemeClr val="tx1"/>
+                </a:solidFill>
+                <a:latin typeface="+mn-lt"/>
+                <a:ea typeface="+mn-ea"/>
+                <a:cs typeface="+mn-cs"/>
+              </a:defRPr>
+            </a:lvl8pPr>
+            <a:lvl9pPr marL="3657600" algn="l" defTabSz="914400" rtl="0" eaLnBrk="1" latinLnBrk="0" hangingPunct="1">
+              <a:defRPr sz="1800" kern="1200">
+                <a:solidFill>
+                  <a:schemeClr val="tx1"/>
+                </a:solidFill>
+                <a:latin typeface="+mn-lt"/>
+                <a:ea typeface="+mn-ea"/>
+                <a:cs typeface="+mn-cs"/>
+              </a:defRPr>
+            </a:lvl9pPr>
+          </a:lstStyle>
+          <a:p>
+            <a:pPr algn="ctr"/>
+            <a:r>
+              <a:rPr lang="en-US" sz="1200" dirty="0" smtClean="0">
+                <a:solidFill>
+                  <a:schemeClr val="tx1">
+                    <a:lumMod val="50000"/>
+                    <a:lumOff val="50000"/>
+                  </a:schemeClr>
+                </a:solidFill>
+              </a:rPr>
+              <a:t>Copyright© 2013, R2AD, LLC</a:t>
+            </a:r>
+            <a:endParaRPr lang="en-US" sz="1200" dirty="0" smtClean="0">
+              <a:solidFill>
+                <a:schemeClr val="tx1">
+                  <a:lumMod val="50000"/>
+                  <a:lumOff val="50000"/>
+                </a:schemeClr>
+              </a:solidFill>
+            </a:endParaRPr>
           </a:p>
         </p:txBody>
       </p:sp>
@@ -4124,13 +4420,7 @@
               <a:rPr lang="en-US">
                 <a:hlinkClick r:id="rId2"/>
               </a:rPr>
-              <a:t>https</a:t>
-            </a:r>
-            <a:r>
-              <a:rPr lang="en-US">
-                <a:hlinkClick r:id="rId2"/>
-              </a:rPr>
-              <a:t>://</a:t>
+              <a:t>https://</a:t>
             </a:r>
             <a:r>
               <a:rPr lang="en-US" smtClean="0">
@@ -5783,7 +6073,7 @@
         </p:nvSpPr>
         <p:spPr>
           <a:xfrm>
-            <a:off x="457200" y="2984878"/>
+            <a:off x="457200" y="2895600"/>
             <a:ext cx="8030830" cy="3785652"/>
           </a:xfrm>
           <a:prstGeom prst="rect">
@@ -7562,7 +7852,7 @@
         </p:nvSpPr>
         <p:spPr>
           <a:xfrm>
-            <a:off x="194930" y="1066800"/>
+            <a:off x="194930" y="990600"/>
             <a:ext cx="8720470" cy="5632311"/>
           </a:xfrm>
           <a:prstGeom prst="rect">
@@ -9125,7 +9415,7 @@
         </p:nvSpPr>
         <p:spPr>
           <a:xfrm>
-            <a:off x="381001" y="5867400"/>
+            <a:off x="381001" y="5715000"/>
             <a:ext cx="8305800" cy="923330"/>
           </a:xfrm>
           <a:prstGeom prst="rect">
@@ -9500,12 +9790,14 @@
         </p:nvSpPr>
         <p:spPr>
           <a:xfrm>
-            <a:off x="440365" y="17721"/>
-            <a:ext cx="8229600" cy="1143000"/>
+            <a:off x="440365" y="76200"/>
+            <a:ext cx="8229600" cy="668079"/>
           </a:xfrm>
         </p:spPr>
         <p:txBody>
-          <a:bodyPr/>
+          <a:bodyPr>
+            <a:normAutofit fontScale="90000"/>
+          </a:bodyPr>
           <a:lstStyle/>
           <a:p>
             <a:r>
@@ -9524,7 +9816,7 @@
         </p:nvSpPr>
         <p:spPr>
           <a:xfrm>
-            <a:off x="381000" y="838200"/>
+            <a:off x="304800" y="685800"/>
             <a:ext cx="8720470" cy="5632311"/>
           </a:xfrm>
           <a:prstGeom prst="rect">
@@ -9892,7 +10184,7 @@
         </p:nvSpPr>
         <p:spPr>
           <a:xfrm>
-            <a:off x="402265" y="6488668"/>
+            <a:off x="402265" y="6324600"/>
             <a:ext cx="8305800" cy="369332"/>
           </a:xfrm>
           <a:prstGeom prst="rect">
@@ -11745,7 +12037,7 @@
         </p:blipFill>
         <p:spPr bwMode="auto">
           <a:xfrm>
-            <a:off x="0" y="3038475"/>
+            <a:off x="0" y="2971800"/>
             <a:ext cx="9410700" cy="3695700"/>
           </a:xfrm>
           <a:prstGeom prst="rect">
@@ -15369,7 +15661,7 @@
         </p:nvSpPr>
         <p:spPr>
           <a:xfrm>
-            <a:off x="4073820" y="6096000"/>
+            <a:off x="4073820" y="5943600"/>
             <a:ext cx="1219200" cy="533400"/>
           </a:xfrm>
           <a:prstGeom prst="roundRect">
@@ -15418,7 +15710,7 @@
         </p:nvSpPr>
         <p:spPr>
           <a:xfrm>
-            <a:off x="4150020" y="6172200"/>
+            <a:off x="4150020" y="6019800"/>
             <a:ext cx="1219200" cy="533400"/>
           </a:xfrm>
           <a:prstGeom prst="roundRect">
@@ -15467,7 +15759,7 @@
         </p:nvSpPr>
         <p:spPr>
           <a:xfrm>
-            <a:off x="4226220" y="6248400"/>
+            <a:off x="4226220" y="6096000"/>
             <a:ext cx="1219200" cy="533400"/>
           </a:xfrm>
           <a:prstGeom prst="roundRect">
@@ -16147,7 +16439,7 @@
         </p:nvSpPr>
         <p:spPr>
           <a:xfrm>
-            <a:off x="4073820" y="5638800"/>
+            <a:off x="4073820" y="5562600"/>
             <a:ext cx="1447800" cy="369332"/>
           </a:xfrm>
           <a:prstGeom prst="rect">

</xml_diff>